<commit_message>
Pfeil in Abb. 5.9 horizontal gerade ausgerichet
</commit_message>
<xml_diff>
--- a/images_originals/vorlagen_zur_Überarbeitung/Abb.5.9_Belebtheitsshierarchie.pptx
+++ b/images_originals/vorlagen_zur_Überarbeitung/Abb.5.9_Belebtheitsshierarchie.pptx
@@ -34,7 +34,7 @@
       </p:grpSpPr>
       <p:sp>
         <p:nvSpPr>
-          <p:cNvPr id="36" name="PlaceHolder 1"/>
+          <p:cNvPr id="38" name="PlaceHolder 1"/>
           <p:cNvSpPr>
             <a:spLocks noGrp="1"/>
           </p:cNvSpPr>
@@ -71,7 +71,7 @@
       </p:sp>
       <p:sp>
         <p:nvSpPr>
-          <p:cNvPr id="37" name="PlaceHolder 2"/>
+          <p:cNvPr id="39" name="PlaceHolder 2"/>
           <p:cNvSpPr>
             <a:spLocks noGrp="1"/>
           </p:cNvSpPr>
@@ -107,7 +107,7 @@
       </p:sp>
       <p:sp>
         <p:nvSpPr>
-          <p:cNvPr id="38" name="PlaceHolder 3"/>
+          <p:cNvPr id="40" name="PlaceHolder 3"/>
           <p:cNvSpPr>
             <a:spLocks noGrp="1"/>
           </p:cNvSpPr>
@@ -143,7 +143,7 @@
       </p:sp>
       <p:sp>
         <p:nvSpPr>
-          <p:cNvPr id="39" name="PlaceHolder 4"/>
+          <p:cNvPr id="41" name="PlaceHolder 4"/>
           <p:cNvSpPr>
             <a:spLocks noGrp="1"/>
           </p:cNvSpPr>
@@ -180,7 +180,7 @@
       </p:sp>
       <p:sp>
         <p:nvSpPr>
-          <p:cNvPr id="40" name="PlaceHolder 5"/>
+          <p:cNvPr id="42" name="PlaceHolder 5"/>
           <p:cNvSpPr>
             <a:spLocks noGrp="1"/>
           </p:cNvSpPr>
@@ -216,7 +216,7 @@
       </p:sp>
       <p:sp>
         <p:nvSpPr>
-          <p:cNvPr id="41" name="PlaceHolder 6"/>
+          <p:cNvPr id="43" name="PlaceHolder 6"/>
           <p:cNvSpPr>
             <a:spLocks noGrp="1"/>
           </p:cNvSpPr>
@@ -239,7 +239,7 @@
           </a:bodyPr>
           <a:p>
             <a:pPr algn="r"/>
-            <a:fld id="{AEFC100B-3C30-4C93-BE84-7AD47BBEE51D}" type="slidenum">
+            <a:fld id="{5C7AFA09-902C-4A9C-8850-85A095A72F43}" type="slidenum">
               <a:rPr b="0" lang="en-GB" sz="1400" spc="-1" strike="noStrike">
                 <a:latin typeface="Times New Roman"/>
               </a:rPr>
@@ -276,7 +276,7 @@
       </p:grpSpPr>
       <p:sp>
         <p:nvSpPr>
-          <p:cNvPr id="63" name="PlaceHolder 1"/>
+          <p:cNvPr id="65" name="PlaceHolder 1"/>
           <p:cNvSpPr>
             <a:spLocks noGrp="1"/>
           </p:cNvSpPr>
@@ -287,16 +287,16 @@
         <p:spPr>
           <a:xfrm>
             <a:off x="1371600" y="1143000"/>
-            <a:ext cx="4114080" cy="3085560"/>
-          </a:xfrm>
-          <a:prstGeom prst="rect">
-            <a:avLst/>
-          </a:prstGeom>
-        </p:spPr>
-      </p:sp>
-      <p:sp>
-        <p:nvSpPr>
-          <p:cNvPr id="64" name="PlaceHolder 2"/>
+            <a:ext cx="4113720" cy="3085200"/>
+          </a:xfrm>
+          <a:prstGeom prst="rect">
+            <a:avLst/>
+          </a:prstGeom>
+        </p:spPr>
+      </p:sp>
+      <p:sp>
+        <p:nvSpPr>
+          <p:cNvPr id="66" name="PlaceHolder 2"/>
           <p:cNvSpPr>
             <a:spLocks noGrp="1"/>
           </p:cNvSpPr>
@@ -307,7 +307,7 @@
         <p:spPr>
           <a:xfrm>
             <a:off x="685800" y="4400640"/>
-            <a:ext cx="5485680" cy="3599640"/>
+            <a:ext cx="5485320" cy="3599280"/>
           </a:xfrm>
           <a:prstGeom prst="rect">
             <a:avLst/>
@@ -318,7 +318,7 @@
             <a:noAutofit/>
           </a:bodyPr>
           <a:p>
-            <a:pPr marL="216000" indent="-215640">
+            <a:pPr marL="216000" indent="-215280">
               <a:lnSpc>
                 <a:spcPct val="100000"/>
               </a:lnSpc>
@@ -334,7 +334,7 @@
             </a:endParaRPr>
           </a:p>
           <a:p>
-            <a:pPr marL="216000" indent="-215640">
+            <a:pPr marL="216000" indent="-215280">
               <a:lnSpc>
                 <a:spcPct val="100000"/>
               </a:lnSpc>
@@ -350,7 +350,7 @@
             </a:endParaRPr>
           </a:p>
           <a:p>
-            <a:pPr marL="216000" indent="-215640">
+            <a:pPr marL="216000" indent="-215280">
               <a:lnSpc>
                 <a:spcPct val="100000"/>
               </a:lnSpc>
@@ -363,7 +363,7 @@
             </a:endParaRPr>
           </a:p>
           <a:p>
-            <a:pPr marL="216000" indent="-215640">
+            <a:pPr marL="216000" indent="-215280">
               <a:lnSpc>
                 <a:spcPct val="100000"/>
               </a:lnSpc>
@@ -379,7 +379,7 @@
             </a:endParaRPr>
           </a:p>
           <a:p>
-            <a:pPr marL="171360" indent="-170640">
+            <a:pPr marL="171360" indent="-170280">
               <a:lnSpc>
                 <a:spcPct val="100000"/>
               </a:lnSpc>
@@ -462,14 +462,14 @@
       </p:sp>
       <p:sp>
         <p:nvSpPr>
-          <p:cNvPr id="65" name="CustomShape 3"/>
+          <p:cNvPr id="67" name="CustomShape 3"/>
           <p:cNvSpPr/>
           <p:nvPr/>
         </p:nvSpPr>
         <p:spPr>
           <a:xfrm>
             <a:off x="3884760" y="8685360"/>
-            <a:ext cx="2971080" cy="457920"/>
+            <a:ext cx="2970720" cy="457560"/>
           </a:xfrm>
           <a:prstGeom prst="rect">
             <a:avLst/>
@@ -495,7 +495,7 @@
                 <a:spcPct val="100000"/>
               </a:lnSpc>
             </a:pPr>
-            <a:fld id="{8573CC02-1F91-4888-A50A-8CB2AD11FBF5}" type="slidenum">
+            <a:fld id="{2453A79F-AC6B-42C0-BC12-F9171F0EF16A}" type="slidenum">
               <a:rPr b="0" lang="de-DE" sz="1200" spc="-1" strike="noStrike">
                 <a:solidFill>
                   <a:srgbClr val="000000"/>
@@ -557,7 +557,7 @@
       </p:grpSpPr>
       <p:sp>
         <p:nvSpPr>
-          <p:cNvPr id="21" name="PlaceHolder 1"/>
+          <p:cNvPr id="23" name="PlaceHolder 1"/>
           <p:cNvSpPr>
             <a:spLocks noGrp="1"/>
           </p:cNvSpPr>
@@ -567,8 +567,8 @@
         </p:nvSpPr>
         <p:spPr>
           <a:xfrm>
-            <a:off x="1521360" y="1444320"/>
-            <a:ext cx="6641640" cy="625320"/>
+            <a:off x="457200" y="273600"/>
+            <a:ext cx="8229240" cy="1144800"/>
           </a:xfrm>
           <a:prstGeom prst="rect">
             <a:avLst/>
@@ -588,7 +588,7 @@
       </p:sp>
       <p:sp>
         <p:nvSpPr>
-          <p:cNvPr id="22" name="PlaceHolder 2"/>
+          <p:cNvPr id="24" name="PlaceHolder 2"/>
           <p:cNvSpPr>
             <a:spLocks noGrp="1"/>
           </p:cNvSpPr>
@@ -598,8 +598,8 @@
         </p:nvSpPr>
         <p:spPr>
           <a:xfrm>
-            <a:off x="1521360" y="2084760"/>
-            <a:ext cx="6641640" cy="819000"/>
+            <a:off x="457200" y="1604520"/>
+            <a:ext cx="8229240" cy="1896840"/>
           </a:xfrm>
           <a:prstGeom prst="rect">
             <a:avLst/>
@@ -618,7 +618,7 @@
       </p:sp>
       <p:sp>
         <p:nvSpPr>
-          <p:cNvPr id="23" name="PlaceHolder 3"/>
+          <p:cNvPr id="25" name="PlaceHolder 3"/>
           <p:cNvSpPr>
             <a:spLocks noGrp="1"/>
           </p:cNvSpPr>
@@ -628,8 +628,8 @@
         </p:nvSpPr>
         <p:spPr>
           <a:xfrm>
-            <a:off x="1521360" y="2981880"/>
-            <a:ext cx="6641640" cy="819000"/>
+            <a:off x="457200" y="3682080"/>
+            <a:ext cx="8229240" cy="1896840"/>
           </a:xfrm>
           <a:prstGeom prst="rect">
             <a:avLst/>
@@ -670,7 +670,7 @@
       </p:grpSpPr>
       <p:sp>
         <p:nvSpPr>
-          <p:cNvPr id="24" name="PlaceHolder 1"/>
+          <p:cNvPr id="26" name="PlaceHolder 1"/>
           <p:cNvSpPr>
             <a:spLocks noGrp="1"/>
           </p:cNvSpPr>
@@ -680,8 +680,8 @@
         </p:nvSpPr>
         <p:spPr>
           <a:xfrm>
-            <a:off x="1521360" y="1444320"/>
-            <a:ext cx="6641640" cy="625320"/>
+            <a:off x="457200" y="273600"/>
+            <a:ext cx="8229240" cy="1144800"/>
           </a:xfrm>
           <a:prstGeom prst="rect">
             <a:avLst/>
@@ -701,7 +701,7 @@
       </p:sp>
       <p:sp>
         <p:nvSpPr>
-          <p:cNvPr id="25" name="PlaceHolder 2"/>
+          <p:cNvPr id="27" name="PlaceHolder 2"/>
           <p:cNvSpPr>
             <a:spLocks noGrp="1"/>
           </p:cNvSpPr>
@@ -711,8 +711,8 @@
         </p:nvSpPr>
         <p:spPr>
           <a:xfrm>
-            <a:off x="1521360" y="2084760"/>
-            <a:ext cx="3241080" cy="819000"/>
+            <a:off x="457200" y="1604520"/>
+            <a:ext cx="4015800" cy="1896840"/>
           </a:xfrm>
           <a:prstGeom prst="rect">
             <a:avLst/>
@@ -720,7 +720,7 @@
         </p:spPr>
         <p:txBody>
           <a:bodyPr lIns="0" rIns="0" tIns="0" bIns="0">
-            <a:normAutofit fontScale="85000"/>
+            <a:normAutofit/>
           </a:bodyPr>
           <a:p>
             <a:endParaRPr b="0" lang="en-GB" sz="3200" spc="-1" strike="noStrike">
@@ -731,7 +731,7 @@
       </p:sp>
       <p:sp>
         <p:nvSpPr>
-          <p:cNvPr id="26" name="PlaceHolder 3"/>
+          <p:cNvPr id="28" name="PlaceHolder 3"/>
           <p:cNvSpPr>
             <a:spLocks noGrp="1"/>
           </p:cNvSpPr>
@@ -741,8 +741,8 @@
         </p:nvSpPr>
         <p:spPr>
           <a:xfrm>
-            <a:off x="4924800" y="2084760"/>
-            <a:ext cx="3241080" cy="819000"/>
+            <a:off x="4674240" y="1604520"/>
+            <a:ext cx="4015800" cy="1896840"/>
           </a:xfrm>
           <a:prstGeom prst="rect">
             <a:avLst/>
@@ -750,7 +750,7 @@
         </p:spPr>
         <p:txBody>
           <a:bodyPr lIns="0" rIns="0" tIns="0" bIns="0">
-            <a:normAutofit fontScale="85000"/>
+            <a:normAutofit/>
           </a:bodyPr>
           <a:p>
             <a:endParaRPr b="0" lang="en-GB" sz="3200" spc="-1" strike="noStrike">
@@ -761,7 +761,7 @@
       </p:sp>
       <p:sp>
         <p:nvSpPr>
-          <p:cNvPr id="27" name="PlaceHolder 4"/>
+          <p:cNvPr id="29" name="PlaceHolder 4"/>
           <p:cNvSpPr>
             <a:spLocks noGrp="1"/>
           </p:cNvSpPr>
@@ -771,8 +771,8 @@
         </p:nvSpPr>
         <p:spPr>
           <a:xfrm>
-            <a:off x="1521360" y="2981880"/>
-            <a:ext cx="3241080" cy="819000"/>
+            <a:off x="457200" y="3682080"/>
+            <a:ext cx="4015800" cy="1896840"/>
           </a:xfrm>
           <a:prstGeom prst="rect">
             <a:avLst/>
@@ -780,7 +780,7 @@
         </p:spPr>
         <p:txBody>
           <a:bodyPr lIns="0" rIns="0" tIns="0" bIns="0">
-            <a:normAutofit fontScale="85000"/>
+            <a:normAutofit/>
           </a:bodyPr>
           <a:p>
             <a:endParaRPr b="0" lang="en-GB" sz="3200" spc="-1" strike="noStrike">
@@ -791,7 +791,7 @@
       </p:sp>
       <p:sp>
         <p:nvSpPr>
-          <p:cNvPr id="28" name="PlaceHolder 5"/>
+          <p:cNvPr id="30" name="PlaceHolder 5"/>
           <p:cNvSpPr>
             <a:spLocks noGrp="1"/>
           </p:cNvSpPr>
@@ -801,8 +801,8 @@
         </p:nvSpPr>
         <p:spPr>
           <a:xfrm>
-            <a:off x="4924800" y="2981880"/>
-            <a:ext cx="3241080" cy="819000"/>
+            <a:off x="4674240" y="3682080"/>
+            <a:ext cx="4015800" cy="1896840"/>
           </a:xfrm>
           <a:prstGeom prst="rect">
             <a:avLst/>
@@ -810,7 +810,7 @@
         </p:spPr>
         <p:txBody>
           <a:bodyPr lIns="0" rIns="0" tIns="0" bIns="0">
-            <a:normAutofit fontScale="85000"/>
+            <a:normAutofit/>
           </a:bodyPr>
           <a:p>
             <a:endParaRPr b="0" lang="en-GB" sz="3200" spc="-1" strike="noStrike">
@@ -843,7 +843,7 @@
       </p:grpSpPr>
       <p:sp>
         <p:nvSpPr>
-          <p:cNvPr id="29" name="PlaceHolder 1"/>
+          <p:cNvPr id="31" name="PlaceHolder 1"/>
           <p:cNvSpPr>
             <a:spLocks noGrp="1"/>
           </p:cNvSpPr>
@@ -853,8 +853,8 @@
         </p:nvSpPr>
         <p:spPr>
           <a:xfrm>
-            <a:off x="1521360" y="1444320"/>
-            <a:ext cx="6641640" cy="625320"/>
+            <a:off x="457200" y="273600"/>
+            <a:ext cx="8229240" cy="1144800"/>
           </a:xfrm>
           <a:prstGeom prst="rect">
             <a:avLst/>
@@ -874,7 +874,7 @@
       </p:sp>
       <p:sp>
         <p:nvSpPr>
-          <p:cNvPr id="30" name="PlaceHolder 2"/>
+          <p:cNvPr id="32" name="PlaceHolder 2"/>
           <p:cNvSpPr>
             <a:spLocks noGrp="1"/>
           </p:cNvSpPr>
@@ -884,8 +884,8 @@
         </p:nvSpPr>
         <p:spPr>
           <a:xfrm>
-            <a:off x="1521360" y="2084760"/>
-            <a:ext cx="2138400" cy="819000"/>
+            <a:off x="457200" y="1604520"/>
+            <a:ext cx="2649600" cy="1896840"/>
           </a:xfrm>
           <a:prstGeom prst="rect">
             <a:avLst/>
@@ -893,7 +893,7 @@
         </p:spPr>
         <p:txBody>
           <a:bodyPr lIns="0" rIns="0" tIns="0" bIns="0">
-            <a:normAutofit fontScale="85000"/>
+            <a:normAutofit/>
           </a:bodyPr>
           <a:p>
             <a:endParaRPr b="0" lang="en-GB" sz="3200" spc="-1" strike="noStrike">
@@ -904,7 +904,7 @@
       </p:sp>
       <p:sp>
         <p:nvSpPr>
-          <p:cNvPr id="31" name="PlaceHolder 3"/>
+          <p:cNvPr id="33" name="PlaceHolder 3"/>
           <p:cNvSpPr>
             <a:spLocks noGrp="1"/>
           </p:cNvSpPr>
@@ -914,8 +914,8 @@
         </p:nvSpPr>
         <p:spPr>
           <a:xfrm>
-            <a:off x="3767040" y="2084760"/>
-            <a:ext cx="2138400" cy="819000"/>
+            <a:off x="3239640" y="1604520"/>
+            <a:ext cx="2649600" cy="1896840"/>
           </a:xfrm>
           <a:prstGeom prst="rect">
             <a:avLst/>
@@ -923,7 +923,7 @@
         </p:spPr>
         <p:txBody>
           <a:bodyPr lIns="0" rIns="0" tIns="0" bIns="0">
-            <a:normAutofit fontScale="85000"/>
+            <a:normAutofit/>
           </a:bodyPr>
           <a:p>
             <a:endParaRPr b="0" lang="en-GB" sz="3200" spc="-1" strike="noStrike">
@@ -934,7 +934,7 @@
       </p:sp>
       <p:sp>
         <p:nvSpPr>
-          <p:cNvPr id="32" name="PlaceHolder 4"/>
+          <p:cNvPr id="34" name="PlaceHolder 4"/>
           <p:cNvSpPr>
             <a:spLocks noGrp="1"/>
           </p:cNvSpPr>
@@ -944,8 +944,8 @@
         </p:nvSpPr>
         <p:spPr>
           <a:xfrm>
-            <a:off x="6012720" y="2084760"/>
-            <a:ext cx="2138400" cy="819000"/>
+            <a:off x="6022080" y="1604520"/>
+            <a:ext cx="2649600" cy="1896840"/>
           </a:xfrm>
           <a:prstGeom prst="rect">
             <a:avLst/>
@@ -953,7 +953,7 @@
         </p:spPr>
         <p:txBody>
           <a:bodyPr lIns="0" rIns="0" tIns="0" bIns="0">
-            <a:normAutofit fontScale="85000"/>
+            <a:normAutofit/>
           </a:bodyPr>
           <a:p>
             <a:endParaRPr b="0" lang="en-GB" sz="3200" spc="-1" strike="noStrike">
@@ -964,7 +964,7 @@
       </p:sp>
       <p:sp>
         <p:nvSpPr>
-          <p:cNvPr id="33" name="PlaceHolder 5"/>
+          <p:cNvPr id="35" name="PlaceHolder 5"/>
           <p:cNvSpPr>
             <a:spLocks noGrp="1"/>
           </p:cNvSpPr>
@@ -974,8 +974,8 @@
         </p:nvSpPr>
         <p:spPr>
           <a:xfrm>
-            <a:off x="1521360" y="2981880"/>
-            <a:ext cx="2138400" cy="819000"/>
+            <a:off x="457200" y="3682080"/>
+            <a:ext cx="2649600" cy="1896840"/>
           </a:xfrm>
           <a:prstGeom prst="rect">
             <a:avLst/>
@@ -983,7 +983,7 @@
         </p:spPr>
         <p:txBody>
           <a:bodyPr lIns="0" rIns="0" tIns="0" bIns="0">
-            <a:normAutofit fontScale="85000"/>
+            <a:normAutofit/>
           </a:bodyPr>
           <a:p>
             <a:endParaRPr b="0" lang="en-GB" sz="3200" spc="-1" strike="noStrike">
@@ -994,7 +994,7 @@
       </p:sp>
       <p:sp>
         <p:nvSpPr>
-          <p:cNvPr id="34" name="PlaceHolder 6"/>
+          <p:cNvPr id="36" name="PlaceHolder 6"/>
           <p:cNvSpPr>
             <a:spLocks noGrp="1"/>
           </p:cNvSpPr>
@@ -1004,8 +1004,8 @@
         </p:nvSpPr>
         <p:spPr>
           <a:xfrm>
-            <a:off x="3767040" y="2981880"/>
-            <a:ext cx="2138400" cy="819000"/>
+            <a:off x="3239640" y="3682080"/>
+            <a:ext cx="2649600" cy="1896840"/>
           </a:xfrm>
           <a:prstGeom prst="rect">
             <a:avLst/>
@@ -1013,7 +1013,7 @@
         </p:spPr>
         <p:txBody>
           <a:bodyPr lIns="0" rIns="0" tIns="0" bIns="0">
-            <a:normAutofit fontScale="85000"/>
+            <a:normAutofit/>
           </a:bodyPr>
           <a:p>
             <a:endParaRPr b="0" lang="en-GB" sz="3200" spc="-1" strike="noStrike">
@@ -1024,7 +1024,7 @@
       </p:sp>
       <p:sp>
         <p:nvSpPr>
-          <p:cNvPr id="35" name="PlaceHolder 7"/>
+          <p:cNvPr id="37" name="PlaceHolder 7"/>
           <p:cNvSpPr>
             <a:spLocks noGrp="1"/>
           </p:cNvSpPr>
@@ -1034,8 +1034,8 @@
         </p:nvSpPr>
         <p:spPr>
           <a:xfrm>
-            <a:off x="6012720" y="2981880"/>
-            <a:ext cx="2138400" cy="819000"/>
+            <a:off x="6022080" y="3682080"/>
+            <a:ext cx="2649600" cy="1896840"/>
           </a:xfrm>
           <a:prstGeom prst="rect">
             <a:avLst/>
@@ -1043,7 +1043,7 @@
         </p:spPr>
         <p:txBody>
           <a:bodyPr lIns="0" rIns="0" tIns="0" bIns="0">
-            <a:normAutofit fontScale="85000"/>
+            <a:normAutofit/>
           </a:bodyPr>
           <a:p>
             <a:endParaRPr b="0" lang="en-GB" sz="3200" spc="-1" strike="noStrike">
@@ -1076,7 +1076,7 @@
       </p:grpSpPr>
       <p:sp>
         <p:nvSpPr>
-          <p:cNvPr id="0" name="PlaceHolder 1"/>
+          <p:cNvPr id="2" name="PlaceHolder 1"/>
           <p:cNvSpPr>
             <a:spLocks noGrp="1"/>
           </p:cNvSpPr>
@@ -1086,8 +1086,8 @@
         </p:nvSpPr>
         <p:spPr>
           <a:xfrm>
-            <a:off x="1521360" y="1444320"/>
-            <a:ext cx="6641640" cy="625320"/>
+            <a:off x="457200" y="273600"/>
+            <a:ext cx="8229240" cy="1144800"/>
           </a:xfrm>
           <a:prstGeom prst="rect">
             <a:avLst/>
@@ -1107,7 +1107,7 @@
       </p:sp>
       <p:sp>
         <p:nvSpPr>
-          <p:cNvPr id="1" name="PlaceHolder 2"/>
+          <p:cNvPr id="3" name="PlaceHolder 2"/>
           <p:cNvSpPr>
             <a:spLocks noGrp="1"/>
           </p:cNvSpPr>
@@ -1117,8 +1117,8 @@
         </p:nvSpPr>
         <p:spPr>
           <a:xfrm>
-            <a:off x="1521360" y="2084760"/>
-            <a:ext cx="6641640" cy="1717560"/>
+            <a:off x="457200" y="1604520"/>
+            <a:ext cx="8229240" cy="3977280"/>
           </a:xfrm>
           <a:prstGeom prst="rect">
             <a:avLst/>
@@ -1160,7 +1160,7 @@
       </p:grpSpPr>
       <p:sp>
         <p:nvSpPr>
-          <p:cNvPr id="2" name="PlaceHolder 1"/>
+          <p:cNvPr id="4" name="PlaceHolder 1"/>
           <p:cNvSpPr>
             <a:spLocks noGrp="1"/>
           </p:cNvSpPr>
@@ -1170,8 +1170,8 @@
         </p:nvSpPr>
         <p:spPr>
           <a:xfrm>
-            <a:off x="1521360" y="1444320"/>
-            <a:ext cx="6641640" cy="625320"/>
+            <a:off x="457200" y="273600"/>
+            <a:ext cx="8229240" cy="1144800"/>
           </a:xfrm>
           <a:prstGeom prst="rect">
             <a:avLst/>
@@ -1191,7 +1191,7 @@
       </p:sp>
       <p:sp>
         <p:nvSpPr>
-          <p:cNvPr id="3" name="PlaceHolder 2"/>
+          <p:cNvPr id="5" name="PlaceHolder 2"/>
           <p:cNvSpPr>
             <a:spLocks noGrp="1"/>
           </p:cNvSpPr>
@@ -1201,8 +1201,8 @@
         </p:nvSpPr>
         <p:spPr>
           <a:xfrm>
-            <a:off x="1521360" y="2084760"/>
-            <a:ext cx="6641640" cy="1717560"/>
+            <a:off x="457200" y="1604520"/>
+            <a:ext cx="8229240" cy="3977280"/>
           </a:xfrm>
           <a:prstGeom prst="rect">
             <a:avLst/>
@@ -1243,7 +1243,7 @@
       </p:grpSpPr>
       <p:sp>
         <p:nvSpPr>
-          <p:cNvPr id="4" name="PlaceHolder 1"/>
+          <p:cNvPr id="6" name="PlaceHolder 1"/>
           <p:cNvSpPr>
             <a:spLocks noGrp="1"/>
           </p:cNvSpPr>
@@ -1253,8 +1253,8 @@
         </p:nvSpPr>
         <p:spPr>
           <a:xfrm>
-            <a:off x="1521360" y="1444320"/>
-            <a:ext cx="6641640" cy="625320"/>
+            <a:off x="457200" y="273600"/>
+            <a:ext cx="8229240" cy="1144800"/>
           </a:xfrm>
           <a:prstGeom prst="rect">
             <a:avLst/>
@@ -1274,7 +1274,7 @@
       </p:sp>
       <p:sp>
         <p:nvSpPr>
-          <p:cNvPr id="5" name="PlaceHolder 2"/>
+          <p:cNvPr id="7" name="PlaceHolder 2"/>
           <p:cNvSpPr>
             <a:spLocks noGrp="1"/>
           </p:cNvSpPr>
@@ -1284,8 +1284,8 @@
         </p:nvSpPr>
         <p:spPr>
           <a:xfrm>
-            <a:off x="1521360" y="2084760"/>
-            <a:ext cx="3241080" cy="1717560"/>
+            <a:off x="457200" y="1604520"/>
+            <a:ext cx="4015800" cy="3977280"/>
           </a:xfrm>
           <a:prstGeom prst="rect">
             <a:avLst/>
@@ -1304,7 +1304,7 @@
       </p:sp>
       <p:sp>
         <p:nvSpPr>
-          <p:cNvPr id="6" name="PlaceHolder 3"/>
+          <p:cNvPr id="8" name="PlaceHolder 3"/>
           <p:cNvSpPr>
             <a:spLocks noGrp="1"/>
           </p:cNvSpPr>
@@ -1314,8 +1314,8 @@
         </p:nvSpPr>
         <p:spPr>
           <a:xfrm>
-            <a:off x="4924800" y="2084760"/>
-            <a:ext cx="3241080" cy="1717560"/>
+            <a:off x="4674240" y="1604520"/>
+            <a:ext cx="4015800" cy="3977280"/>
           </a:xfrm>
           <a:prstGeom prst="rect">
             <a:avLst/>
@@ -1356,7 +1356,7 @@
       </p:grpSpPr>
       <p:sp>
         <p:nvSpPr>
-          <p:cNvPr id="7" name="PlaceHolder 1"/>
+          <p:cNvPr id="9" name="PlaceHolder 1"/>
           <p:cNvSpPr>
             <a:spLocks noGrp="1"/>
           </p:cNvSpPr>
@@ -1366,8 +1366,8 @@
         </p:nvSpPr>
         <p:spPr>
           <a:xfrm>
-            <a:off x="1521360" y="1444320"/>
-            <a:ext cx="6641640" cy="625320"/>
+            <a:off x="457200" y="273600"/>
+            <a:ext cx="8229240" cy="1144800"/>
           </a:xfrm>
           <a:prstGeom prst="rect">
             <a:avLst/>
@@ -1409,7 +1409,7 @@
       </p:grpSpPr>
       <p:sp>
         <p:nvSpPr>
-          <p:cNvPr id="8" name="PlaceHolder 1"/>
+          <p:cNvPr id="10" name="PlaceHolder 1"/>
           <p:cNvSpPr>
             <a:spLocks noGrp="1"/>
           </p:cNvSpPr>
@@ -1419,8 +1419,8 @@
         </p:nvSpPr>
         <p:spPr>
           <a:xfrm>
-            <a:off x="1521360" y="1509840"/>
-            <a:ext cx="6641640" cy="2292480"/>
+            <a:off x="457200" y="273600"/>
+            <a:ext cx="8229240" cy="5307840"/>
           </a:xfrm>
           <a:prstGeom prst="rect">
             <a:avLst/>
@@ -1462,7 +1462,7 @@
       </p:grpSpPr>
       <p:sp>
         <p:nvSpPr>
-          <p:cNvPr id="9" name="PlaceHolder 1"/>
+          <p:cNvPr id="11" name="PlaceHolder 1"/>
           <p:cNvSpPr>
             <a:spLocks noGrp="1"/>
           </p:cNvSpPr>
@@ -1472,8 +1472,8 @@
         </p:nvSpPr>
         <p:spPr>
           <a:xfrm>
-            <a:off x="1521360" y="1444320"/>
-            <a:ext cx="6641640" cy="625320"/>
+            <a:off x="457200" y="273600"/>
+            <a:ext cx="8229240" cy="1144800"/>
           </a:xfrm>
           <a:prstGeom prst="rect">
             <a:avLst/>
@@ -1493,7 +1493,7 @@
       </p:sp>
       <p:sp>
         <p:nvSpPr>
-          <p:cNvPr id="10" name="PlaceHolder 2"/>
+          <p:cNvPr id="12" name="PlaceHolder 2"/>
           <p:cNvSpPr>
             <a:spLocks noGrp="1"/>
           </p:cNvSpPr>
@@ -1503,38 +1503,8 @@
         </p:nvSpPr>
         <p:spPr>
           <a:xfrm>
-            <a:off x="1521360" y="2084760"/>
-            <a:ext cx="3241080" cy="819000"/>
-          </a:xfrm>
-          <a:prstGeom prst="rect">
-            <a:avLst/>
-          </a:prstGeom>
-        </p:spPr>
-        <p:txBody>
-          <a:bodyPr lIns="0" rIns="0" tIns="0" bIns="0">
-            <a:normAutofit fontScale="85000"/>
-          </a:bodyPr>
-          <a:p>
-            <a:endParaRPr b="0" lang="en-GB" sz="3200" spc="-1" strike="noStrike">
-              <a:latin typeface="Arial"/>
-            </a:endParaRPr>
-          </a:p>
-        </p:txBody>
-      </p:sp>
-      <p:sp>
-        <p:nvSpPr>
-          <p:cNvPr id="11" name="PlaceHolder 3"/>
-          <p:cNvSpPr>
-            <a:spLocks noGrp="1"/>
-          </p:cNvSpPr>
-          <p:nvPr>
-            <p:ph type="body"/>
-          </p:nvPr>
-        </p:nvSpPr>
-        <p:spPr>
-          <a:xfrm>
-            <a:off x="4924800" y="2084760"/>
-            <a:ext cx="3241080" cy="1717560"/>
+            <a:off x="457200" y="1604520"/>
+            <a:ext cx="4015800" cy="1896840"/>
           </a:xfrm>
           <a:prstGeom prst="rect">
             <a:avLst/>
@@ -1553,7 +1523,7 @@
       </p:sp>
       <p:sp>
         <p:nvSpPr>
-          <p:cNvPr id="12" name="PlaceHolder 4"/>
+          <p:cNvPr id="13" name="PlaceHolder 3"/>
           <p:cNvSpPr>
             <a:spLocks noGrp="1"/>
           </p:cNvSpPr>
@@ -1563,8 +1533,8 @@
         </p:nvSpPr>
         <p:spPr>
           <a:xfrm>
-            <a:off x="1521360" y="2981880"/>
-            <a:ext cx="3241080" cy="819000"/>
+            <a:off x="4674240" y="1604520"/>
+            <a:ext cx="4015800" cy="3977280"/>
           </a:xfrm>
           <a:prstGeom prst="rect">
             <a:avLst/>
@@ -1572,7 +1542,37 @@
         </p:spPr>
         <p:txBody>
           <a:bodyPr lIns="0" rIns="0" tIns="0" bIns="0">
-            <a:normAutofit fontScale="85000"/>
+            <a:normAutofit/>
+          </a:bodyPr>
+          <a:p>
+            <a:endParaRPr b="0" lang="en-GB" sz="3200" spc="-1" strike="noStrike">
+              <a:latin typeface="Arial"/>
+            </a:endParaRPr>
+          </a:p>
+        </p:txBody>
+      </p:sp>
+      <p:sp>
+        <p:nvSpPr>
+          <p:cNvPr id="14" name="PlaceHolder 4"/>
+          <p:cNvSpPr>
+            <a:spLocks noGrp="1"/>
+          </p:cNvSpPr>
+          <p:nvPr>
+            <p:ph type="body"/>
+          </p:nvPr>
+        </p:nvSpPr>
+        <p:spPr>
+          <a:xfrm>
+            <a:off x="457200" y="3682080"/>
+            <a:ext cx="4015800" cy="1896840"/>
+          </a:xfrm>
+          <a:prstGeom prst="rect">
+            <a:avLst/>
+          </a:prstGeom>
+        </p:spPr>
+        <p:txBody>
+          <a:bodyPr lIns="0" rIns="0" tIns="0" bIns="0">
+            <a:normAutofit/>
           </a:bodyPr>
           <a:p>
             <a:endParaRPr b="0" lang="en-GB" sz="3200" spc="-1" strike="noStrike">
@@ -1605,7 +1605,7 @@
       </p:grpSpPr>
       <p:sp>
         <p:nvSpPr>
-          <p:cNvPr id="13" name="PlaceHolder 1"/>
+          <p:cNvPr id="15" name="PlaceHolder 1"/>
           <p:cNvSpPr>
             <a:spLocks noGrp="1"/>
           </p:cNvSpPr>
@@ -1615,8 +1615,8 @@
         </p:nvSpPr>
         <p:spPr>
           <a:xfrm>
-            <a:off x="1521360" y="1444320"/>
-            <a:ext cx="6641640" cy="625320"/>
+            <a:off x="457200" y="273600"/>
+            <a:ext cx="8229240" cy="1144800"/>
           </a:xfrm>
           <a:prstGeom prst="rect">
             <a:avLst/>
@@ -1636,7 +1636,7 @@
       </p:sp>
       <p:sp>
         <p:nvSpPr>
-          <p:cNvPr id="14" name="PlaceHolder 2"/>
+          <p:cNvPr id="16" name="PlaceHolder 2"/>
           <p:cNvSpPr>
             <a:spLocks noGrp="1"/>
           </p:cNvSpPr>
@@ -1646,8 +1646,8 @@
         </p:nvSpPr>
         <p:spPr>
           <a:xfrm>
-            <a:off x="1521360" y="2084760"/>
-            <a:ext cx="3241080" cy="1717560"/>
+            <a:off x="457200" y="1604520"/>
+            <a:ext cx="4015800" cy="3977280"/>
           </a:xfrm>
           <a:prstGeom prst="rect">
             <a:avLst/>
@@ -1666,7 +1666,7 @@
       </p:sp>
       <p:sp>
         <p:nvSpPr>
-          <p:cNvPr id="15" name="PlaceHolder 3"/>
+          <p:cNvPr id="17" name="PlaceHolder 3"/>
           <p:cNvSpPr>
             <a:spLocks noGrp="1"/>
           </p:cNvSpPr>
@@ -1676,8 +1676,8 @@
         </p:nvSpPr>
         <p:spPr>
           <a:xfrm>
-            <a:off x="4924800" y="2084760"/>
-            <a:ext cx="3241080" cy="819000"/>
+            <a:off x="4674240" y="1604520"/>
+            <a:ext cx="4015800" cy="1896840"/>
           </a:xfrm>
           <a:prstGeom prst="rect">
             <a:avLst/>
@@ -1685,7 +1685,7 @@
         </p:spPr>
         <p:txBody>
           <a:bodyPr lIns="0" rIns="0" tIns="0" bIns="0">
-            <a:normAutofit fontScale="85000"/>
+            <a:normAutofit/>
           </a:bodyPr>
           <a:p>
             <a:endParaRPr b="0" lang="en-GB" sz="3200" spc="-1" strike="noStrike">
@@ -1696,7 +1696,7 @@
       </p:sp>
       <p:sp>
         <p:nvSpPr>
-          <p:cNvPr id="16" name="PlaceHolder 4"/>
+          <p:cNvPr id="18" name="PlaceHolder 4"/>
           <p:cNvSpPr>
             <a:spLocks noGrp="1"/>
           </p:cNvSpPr>
@@ -1706,8 +1706,8 @@
         </p:nvSpPr>
         <p:spPr>
           <a:xfrm>
-            <a:off x="4924800" y="2981880"/>
-            <a:ext cx="3241080" cy="819000"/>
+            <a:off x="4674240" y="3682080"/>
+            <a:ext cx="4015800" cy="1896840"/>
           </a:xfrm>
           <a:prstGeom prst="rect">
             <a:avLst/>
@@ -1715,7 +1715,7 @@
         </p:spPr>
         <p:txBody>
           <a:bodyPr lIns="0" rIns="0" tIns="0" bIns="0">
-            <a:normAutofit fontScale="85000"/>
+            <a:normAutofit/>
           </a:bodyPr>
           <a:p>
             <a:endParaRPr b="0" lang="en-GB" sz="3200" spc="-1" strike="noStrike">
@@ -1748,7 +1748,7 @@
       </p:grpSpPr>
       <p:sp>
         <p:nvSpPr>
-          <p:cNvPr id="17" name="PlaceHolder 1"/>
+          <p:cNvPr id="19" name="PlaceHolder 1"/>
           <p:cNvSpPr>
             <a:spLocks noGrp="1"/>
           </p:cNvSpPr>
@@ -1758,8 +1758,8 @@
         </p:nvSpPr>
         <p:spPr>
           <a:xfrm>
-            <a:off x="1521360" y="1444320"/>
-            <a:ext cx="6641640" cy="625320"/>
+            <a:off x="457200" y="273600"/>
+            <a:ext cx="8229240" cy="1144800"/>
           </a:xfrm>
           <a:prstGeom prst="rect">
             <a:avLst/>
@@ -1779,7 +1779,7 @@
       </p:sp>
       <p:sp>
         <p:nvSpPr>
-          <p:cNvPr id="18" name="PlaceHolder 2"/>
+          <p:cNvPr id="20" name="PlaceHolder 2"/>
           <p:cNvSpPr>
             <a:spLocks noGrp="1"/>
           </p:cNvSpPr>
@@ -1789,8 +1789,8 @@
         </p:nvSpPr>
         <p:spPr>
           <a:xfrm>
-            <a:off x="1521360" y="2084760"/>
-            <a:ext cx="3241080" cy="819000"/>
+            <a:off x="457200" y="1604520"/>
+            <a:ext cx="4015800" cy="1896840"/>
           </a:xfrm>
           <a:prstGeom prst="rect">
             <a:avLst/>
@@ -1798,7 +1798,7 @@
         </p:spPr>
         <p:txBody>
           <a:bodyPr lIns="0" rIns="0" tIns="0" bIns="0">
-            <a:normAutofit fontScale="85000"/>
+            <a:normAutofit/>
           </a:bodyPr>
           <a:p>
             <a:endParaRPr b="0" lang="en-GB" sz="3200" spc="-1" strike="noStrike">
@@ -1809,7 +1809,7 @@
       </p:sp>
       <p:sp>
         <p:nvSpPr>
-          <p:cNvPr id="19" name="PlaceHolder 3"/>
+          <p:cNvPr id="21" name="PlaceHolder 3"/>
           <p:cNvSpPr>
             <a:spLocks noGrp="1"/>
           </p:cNvSpPr>
@@ -1819,8 +1819,8 @@
         </p:nvSpPr>
         <p:spPr>
           <a:xfrm>
-            <a:off x="4924800" y="2084760"/>
-            <a:ext cx="3241080" cy="819000"/>
+            <a:off x="4674240" y="1604520"/>
+            <a:ext cx="4015800" cy="1896840"/>
           </a:xfrm>
           <a:prstGeom prst="rect">
             <a:avLst/>
@@ -1828,7 +1828,7 @@
         </p:spPr>
         <p:txBody>
           <a:bodyPr lIns="0" rIns="0" tIns="0" bIns="0">
-            <a:normAutofit fontScale="85000"/>
+            <a:normAutofit/>
           </a:bodyPr>
           <a:p>
             <a:endParaRPr b="0" lang="en-GB" sz="3200" spc="-1" strike="noStrike">
@@ -1839,7 +1839,7 @@
       </p:sp>
       <p:sp>
         <p:nvSpPr>
-          <p:cNvPr id="20" name="PlaceHolder 4"/>
+          <p:cNvPr id="22" name="PlaceHolder 4"/>
           <p:cNvSpPr>
             <a:spLocks noGrp="1"/>
           </p:cNvSpPr>
@@ -1849,8 +1849,8 @@
         </p:nvSpPr>
         <p:spPr>
           <a:xfrm>
-            <a:off x="1521360" y="2981880"/>
-            <a:ext cx="6641640" cy="819000"/>
+            <a:off x="457200" y="3682080"/>
+            <a:ext cx="8229240" cy="1896840"/>
           </a:xfrm>
           <a:prstGeom prst="rect">
             <a:avLst/>
@@ -1896,6 +1896,222 @@
           <a:chExt cx="0" cy="0"/>
         </a:xfrm>
       </p:grpSpPr>
+      <p:sp>
+        <p:nvSpPr>
+          <p:cNvPr id="0" name="PlaceHolder 1"/>
+          <p:cNvSpPr>
+            <a:spLocks noGrp="1"/>
+          </p:cNvSpPr>
+          <p:nvPr>
+            <p:ph type="title"/>
+          </p:nvPr>
+        </p:nvSpPr>
+        <p:spPr>
+          <a:xfrm>
+            <a:off x="457200" y="273600"/>
+            <a:ext cx="8229240" cy="1144800"/>
+          </a:xfrm>
+          <a:prstGeom prst="rect">
+            <a:avLst/>
+          </a:prstGeom>
+        </p:spPr>
+        <p:txBody>
+          <a:bodyPr lIns="0" rIns="0" tIns="0" bIns="0" anchor="ctr">
+            <a:noAutofit/>
+          </a:bodyPr>
+          <a:p>
+            <a:pPr algn="ctr"/>
+            <a:r>
+              <a:rPr b="0" lang="en-GB" sz="4400" spc="-1" strike="noStrike">
+                <a:latin typeface="Arial"/>
+              </a:rPr>
+              <a:t>Click to edit the title text format</a:t>
+            </a:r>
+            <a:endParaRPr b="0" lang="en-GB" sz="4400" spc="-1" strike="noStrike">
+              <a:latin typeface="Arial"/>
+            </a:endParaRPr>
+          </a:p>
+        </p:txBody>
+      </p:sp>
+      <p:sp>
+        <p:nvSpPr>
+          <p:cNvPr id="1" name="PlaceHolder 2"/>
+          <p:cNvSpPr>
+            <a:spLocks noGrp="1"/>
+          </p:cNvSpPr>
+          <p:nvPr>
+            <p:ph type="body"/>
+          </p:nvPr>
+        </p:nvSpPr>
+        <p:spPr>
+          <a:xfrm>
+            <a:off x="457200" y="1604520"/>
+            <a:ext cx="8229240" cy="3977280"/>
+          </a:xfrm>
+          <a:prstGeom prst="rect">
+            <a:avLst/>
+          </a:prstGeom>
+        </p:spPr>
+        <p:txBody>
+          <a:bodyPr lIns="0" rIns="0" tIns="0" bIns="0">
+            <a:normAutofit/>
+          </a:bodyPr>
+          <a:p>
+            <a:pPr marL="432000" indent="-324000">
+              <a:spcBef>
+                <a:spcPts val="1417"/>
+              </a:spcBef>
+              <a:buClr>
+                <a:srgbClr val="000000"/>
+              </a:buClr>
+              <a:buSzPct val="45000"/>
+              <a:buFont typeface="Wingdings" charset="2"/>
+              <a:buChar char=""/>
+            </a:pPr>
+            <a:r>
+              <a:rPr b="0" lang="en-GB" sz="3200" spc="-1" strike="noStrike">
+                <a:latin typeface="Arial"/>
+              </a:rPr>
+              <a:t>Click to edit the outline text format</a:t>
+            </a:r>
+            <a:endParaRPr b="0" lang="en-GB" sz="3200" spc="-1" strike="noStrike">
+              <a:latin typeface="Arial"/>
+            </a:endParaRPr>
+          </a:p>
+          <a:p>
+            <a:pPr lvl="1" marL="864000" indent="-324000">
+              <a:spcBef>
+                <a:spcPts val="1134"/>
+              </a:spcBef>
+              <a:buClr>
+                <a:srgbClr val="000000"/>
+              </a:buClr>
+              <a:buSzPct val="75000"/>
+              <a:buFont typeface="Symbol" charset="2"/>
+              <a:buChar char=""/>
+            </a:pPr>
+            <a:r>
+              <a:rPr b="0" lang="en-GB" sz="2800" spc="-1" strike="noStrike">
+                <a:latin typeface="Arial"/>
+              </a:rPr>
+              <a:t>Second Outline Level</a:t>
+            </a:r>
+            <a:endParaRPr b="0" lang="en-GB" sz="2800" spc="-1" strike="noStrike">
+              <a:latin typeface="Arial"/>
+            </a:endParaRPr>
+          </a:p>
+          <a:p>
+            <a:pPr lvl="2" marL="1296000" indent="-288000">
+              <a:spcBef>
+                <a:spcPts val="850"/>
+              </a:spcBef>
+              <a:buClr>
+                <a:srgbClr val="000000"/>
+              </a:buClr>
+              <a:buSzPct val="45000"/>
+              <a:buFont typeface="Wingdings" charset="2"/>
+              <a:buChar char=""/>
+            </a:pPr>
+            <a:r>
+              <a:rPr b="0" lang="en-GB" sz="2400" spc="-1" strike="noStrike">
+                <a:latin typeface="Arial"/>
+              </a:rPr>
+              <a:t>Third Outline Level</a:t>
+            </a:r>
+            <a:endParaRPr b="0" lang="en-GB" sz="2400" spc="-1" strike="noStrike">
+              <a:latin typeface="Arial"/>
+            </a:endParaRPr>
+          </a:p>
+          <a:p>
+            <a:pPr lvl="3" marL="1728000" indent="-216000">
+              <a:spcBef>
+                <a:spcPts val="567"/>
+              </a:spcBef>
+              <a:buClr>
+                <a:srgbClr val="000000"/>
+              </a:buClr>
+              <a:buSzPct val="75000"/>
+              <a:buFont typeface="Symbol" charset="2"/>
+              <a:buChar char=""/>
+            </a:pPr>
+            <a:r>
+              <a:rPr b="0" lang="en-GB" sz="2000" spc="-1" strike="noStrike">
+                <a:latin typeface="Arial"/>
+              </a:rPr>
+              <a:t>Fourth Outline Level</a:t>
+            </a:r>
+            <a:endParaRPr b="0" lang="en-GB" sz="2000" spc="-1" strike="noStrike">
+              <a:latin typeface="Arial"/>
+            </a:endParaRPr>
+          </a:p>
+          <a:p>
+            <a:pPr lvl="4" marL="2160000" indent="-216000">
+              <a:spcBef>
+                <a:spcPts val="283"/>
+              </a:spcBef>
+              <a:buClr>
+                <a:srgbClr val="000000"/>
+              </a:buClr>
+              <a:buSzPct val="45000"/>
+              <a:buFont typeface="Wingdings" charset="2"/>
+              <a:buChar char=""/>
+            </a:pPr>
+            <a:r>
+              <a:rPr b="0" lang="en-GB" sz="2000" spc="-1" strike="noStrike">
+                <a:latin typeface="Arial"/>
+              </a:rPr>
+              <a:t>Fifth Outline Level</a:t>
+            </a:r>
+            <a:endParaRPr b="0" lang="en-GB" sz="2000" spc="-1" strike="noStrike">
+              <a:latin typeface="Arial"/>
+            </a:endParaRPr>
+          </a:p>
+          <a:p>
+            <a:pPr lvl="5" marL="2592000" indent="-216000">
+              <a:spcBef>
+                <a:spcPts val="283"/>
+              </a:spcBef>
+              <a:buClr>
+                <a:srgbClr val="000000"/>
+              </a:buClr>
+              <a:buSzPct val="45000"/>
+              <a:buFont typeface="Wingdings" charset="2"/>
+              <a:buChar char=""/>
+            </a:pPr>
+            <a:r>
+              <a:rPr b="0" lang="en-GB" sz="2000" spc="-1" strike="noStrike">
+                <a:latin typeface="Arial"/>
+              </a:rPr>
+              <a:t>Sixth Outline Level</a:t>
+            </a:r>
+            <a:endParaRPr b="0" lang="en-GB" sz="2000" spc="-1" strike="noStrike">
+              <a:latin typeface="Arial"/>
+            </a:endParaRPr>
+          </a:p>
+          <a:p>
+            <a:pPr lvl="6" marL="3024000" indent="-216000">
+              <a:spcBef>
+                <a:spcPts val="283"/>
+              </a:spcBef>
+              <a:buClr>
+                <a:srgbClr val="000000"/>
+              </a:buClr>
+              <a:buSzPct val="45000"/>
+              <a:buFont typeface="Wingdings" charset="2"/>
+              <a:buChar char=""/>
+            </a:pPr>
+            <a:r>
+              <a:rPr b="0" lang="en-GB" sz="2000" spc="-1" strike="noStrike">
+                <a:latin typeface="Arial"/>
+              </a:rPr>
+              <a:t>Seventh Outline Level</a:t>
+            </a:r>
+            <a:endParaRPr b="0" lang="en-GB" sz="2000" spc="-1" strike="noStrike">
+              <a:latin typeface="Arial"/>
+            </a:endParaRPr>
+          </a:p>
+        </p:txBody>
+      </p:sp>
     </p:spTree>
   </p:cSld>
   <p:clrMap bg1="lt1" bg2="lt2" tx1="dk1" tx2="dk2" accent1="accent1" accent2="accent2" accent3="accent3" accent4="accent4" accent5="accent5" accent6="accent6" hlink="hlink" folHlink="folHlink"/>
@@ -1935,14 +2151,14 @@
       </p:grpSpPr>
       <p:sp>
         <p:nvSpPr>
-          <p:cNvPr id="42" name="CustomShape 1"/>
+          <p:cNvPr id="44" name="CustomShape 1"/>
           <p:cNvSpPr/>
           <p:nvPr/>
         </p:nvSpPr>
         <p:spPr>
           <a:xfrm>
             <a:off x="7383600" y="1355760"/>
-            <a:ext cx="1098000" cy="367920"/>
+            <a:ext cx="1097640" cy="367560"/>
           </a:xfrm>
           <a:prstGeom prst="rect">
             <a:avLst/>
@@ -1986,14 +2202,14 @@
       </p:sp>
       <p:sp>
         <p:nvSpPr>
-          <p:cNvPr id="43" name="CustomShape 2"/>
+          <p:cNvPr id="45" name="CustomShape 2"/>
           <p:cNvSpPr/>
           <p:nvPr/>
         </p:nvSpPr>
         <p:spPr>
           <a:xfrm>
             <a:off x="898560" y="2168280"/>
-            <a:ext cx="2302920" cy="703080"/>
+            <a:ext cx="2302560" cy="703080"/>
           </a:xfrm>
           <a:prstGeom prst="rect">
             <a:avLst/>
@@ -2048,14 +2264,14 @@
       </p:sp>
       <p:sp>
         <p:nvSpPr>
-          <p:cNvPr id="44" name="CustomShape 3"/>
+          <p:cNvPr id="46" name="CustomShape 3"/>
           <p:cNvSpPr/>
           <p:nvPr/>
         </p:nvSpPr>
         <p:spPr>
           <a:xfrm flipV="1">
-            <a:off x="1209600" y="2079360"/>
-            <a:ext cx="7295400" cy="27360"/>
+            <a:off x="1209600" y="2104920"/>
+            <a:ext cx="7295040" cy="360"/>
           </a:xfrm>
           <a:custGeom>
             <a:avLst/>
@@ -2092,14 +2308,14 @@
       </p:sp>
       <p:sp>
         <p:nvSpPr>
-          <p:cNvPr id="45" name="CustomShape 4"/>
+          <p:cNvPr id="47" name="CustomShape 4"/>
           <p:cNvSpPr/>
           <p:nvPr/>
         </p:nvSpPr>
         <p:spPr>
           <a:xfrm>
             <a:off x="6372360" y="2168280"/>
-            <a:ext cx="2512440" cy="703080"/>
+            <a:ext cx="2512080" cy="703080"/>
           </a:xfrm>
           <a:prstGeom prst="rect">
             <a:avLst/>
@@ -2154,14 +2370,14 @@
       </p:sp>
       <p:sp>
         <p:nvSpPr>
-          <p:cNvPr id="46" name="CustomShape 5"/>
+          <p:cNvPr id="48" name="CustomShape 5"/>
           <p:cNvSpPr/>
           <p:nvPr/>
         </p:nvSpPr>
         <p:spPr>
           <a:xfrm>
             <a:off x="1198800" y="1355760"/>
-            <a:ext cx="1134720" cy="367920"/>
+            <a:ext cx="1134360" cy="367560"/>
           </a:xfrm>
           <a:prstGeom prst="rect">
             <a:avLst/>
@@ -2205,14 +2421,14 @@
       </p:sp>
       <p:sp>
         <p:nvSpPr>
-          <p:cNvPr id="47" name="CustomShape 6"/>
+          <p:cNvPr id="49" name="CustomShape 6"/>
           <p:cNvSpPr/>
           <p:nvPr/>
         </p:nvSpPr>
         <p:spPr>
           <a:xfrm>
             <a:off x="2365560" y="1355760"/>
-            <a:ext cx="668520" cy="367920"/>
+            <a:ext cx="668160" cy="367560"/>
           </a:xfrm>
           <a:prstGeom prst="rect">
             <a:avLst/>
@@ -2256,14 +2472,14 @@
       </p:sp>
       <p:sp>
         <p:nvSpPr>
-          <p:cNvPr id="48" name="CustomShape 7"/>
+          <p:cNvPr id="50" name="CustomShape 7"/>
           <p:cNvSpPr/>
           <p:nvPr/>
         </p:nvSpPr>
         <p:spPr>
           <a:xfrm>
             <a:off x="4076640" y="1355760"/>
-            <a:ext cx="1387800" cy="367920"/>
+            <a:ext cx="1387440" cy="367560"/>
           </a:xfrm>
           <a:prstGeom prst="rect">
             <a:avLst/>
@@ -2307,14 +2523,14 @@
       </p:sp>
       <p:sp>
         <p:nvSpPr>
-          <p:cNvPr id="49" name="CustomShape 8"/>
+          <p:cNvPr id="51" name="CustomShape 8"/>
           <p:cNvSpPr/>
           <p:nvPr/>
         </p:nvSpPr>
         <p:spPr>
           <a:xfrm>
             <a:off x="3022920" y="1355760"/>
-            <a:ext cx="979200" cy="367920"/>
+            <a:ext cx="978840" cy="367560"/>
           </a:xfrm>
           <a:prstGeom prst="rect">
             <a:avLst/>
@@ -2358,14 +2574,14 @@
       </p:sp>
       <p:sp>
         <p:nvSpPr>
-          <p:cNvPr id="50" name="CustomShape 9"/>
+          <p:cNvPr id="52" name="CustomShape 9"/>
           <p:cNvSpPr/>
           <p:nvPr/>
         </p:nvSpPr>
         <p:spPr>
           <a:xfrm>
             <a:off x="5497200" y="1355760"/>
-            <a:ext cx="1133280" cy="367920"/>
+            <a:ext cx="1132920" cy="367560"/>
           </a:xfrm>
           <a:prstGeom prst="rect">
             <a:avLst/>
@@ -2409,14 +2625,14 @@
       </p:sp>
       <p:sp>
         <p:nvSpPr>
-          <p:cNvPr id="51" name="CustomShape 10"/>
+          <p:cNvPr id="53" name="CustomShape 10"/>
           <p:cNvSpPr/>
           <p:nvPr/>
         </p:nvSpPr>
         <p:spPr>
           <a:xfrm>
             <a:off x="6658560" y="1355760"/>
-            <a:ext cx="714240" cy="367920"/>
+            <a:ext cx="713880" cy="367560"/>
           </a:xfrm>
           <a:prstGeom prst="rect">
             <a:avLst/>
@@ -2460,14 +2676,14 @@
       </p:sp>
       <p:sp>
         <p:nvSpPr>
-          <p:cNvPr id="52" name="CustomShape 11"/>
+          <p:cNvPr id="54" name="CustomShape 11"/>
           <p:cNvSpPr/>
           <p:nvPr/>
         </p:nvSpPr>
         <p:spPr>
           <a:xfrm>
             <a:off x="7219800" y="2871720"/>
-            <a:ext cx="1998000" cy="1465200"/>
+            <a:ext cx="1997640" cy="1464840"/>
           </a:xfrm>
           <a:prstGeom prst="rect">
             <a:avLst/>
@@ -2591,14 +2807,14 @@
       </p:sp>
       <p:sp>
         <p:nvSpPr>
-          <p:cNvPr id="53" name="CustomShape 12"/>
+          <p:cNvPr id="55" name="CustomShape 12"/>
           <p:cNvSpPr/>
           <p:nvPr/>
         </p:nvSpPr>
         <p:spPr>
           <a:xfrm>
             <a:off x="3746520" y="3497040"/>
-            <a:ext cx="2710800" cy="398160"/>
+            <a:ext cx="2710440" cy="398160"/>
           </a:xfrm>
           <a:prstGeom prst="rect">
             <a:avLst/>
@@ -2642,14 +2858,14 @@
       </p:sp>
       <p:sp>
         <p:nvSpPr>
-          <p:cNvPr id="54" name="CustomShape 13"/>
+          <p:cNvPr id="56" name="CustomShape 13"/>
           <p:cNvSpPr/>
           <p:nvPr/>
         </p:nvSpPr>
         <p:spPr>
           <a:xfrm>
-            <a:off x="1120680" y="1709280"/>
-            <a:ext cx="7813080" cy="306720"/>
+            <a:off x="1480680" y="1709280"/>
+            <a:ext cx="7812720" cy="306360"/>
           </a:xfrm>
           <a:prstGeom prst="rect">
             <a:avLst/>
@@ -2693,14 +2909,14 @@
       </p:sp>
       <p:sp>
         <p:nvSpPr>
-          <p:cNvPr id="55" name="CustomShape 14"/>
+          <p:cNvPr id="57" name="CustomShape 14"/>
           <p:cNvSpPr/>
           <p:nvPr/>
         </p:nvSpPr>
         <p:spPr>
           <a:xfrm>
             <a:off x="3872880" y="3948840"/>
-            <a:ext cx="2158200" cy="398160"/>
+            <a:ext cx="2157840" cy="398160"/>
           </a:xfrm>
           <a:prstGeom prst="rect">
             <a:avLst/>
@@ -2744,14 +2960,14 @@
       </p:sp>
       <p:sp>
         <p:nvSpPr>
-          <p:cNvPr id="56" name="CustomShape 15"/>
+          <p:cNvPr id="58" name="CustomShape 15"/>
           <p:cNvSpPr/>
           <p:nvPr/>
         </p:nvSpPr>
         <p:spPr>
           <a:xfrm>
             <a:off x="1790280" y="2871720"/>
-            <a:ext cx="1569240" cy="1465200"/>
+            <a:ext cx="1568880" cy="1464840"/>
           </a:xfrm>
           <a:prstGeom prst="rect">
             <a:avLst/>
@@ -2875,28 +3091,28 @@
       </p:sp>
       <p:grpSp>
         <p:nvGrpSpPr>
-          <p:cNvPr id="57" name="Group 16"/>
+          <p:cNvPr id="59" name="Group 16"/>
           <p:cNvGrpSpPr/>
           <p:nvPr/>
         </p:nvGrpSpPr>
         <p:grpSpPr>
           <a:xfrm>
             <a:off x="1267200" y="3200760"/>
-            <a:ext cx="531000" cy="516600"/>
+            <a:ext cx="530640" cy="516240"/>
             <a:chOff x="1267200" y="3200760"/>
-            <a:chExt cx="531000" cy="516600"/>
+            <a:chExt cx="530640" cy="516240"/>
           </a:xfrm>
         </p:grpSpPr>
         <p:sp>
           <p:nvSpPr>
-            <p:cNvPr id="58" name="CustomShape 17"/>
+            <p:cNvPr id="60" name="CustomShape 17"/>
             <p:cNvSpPr/>
             <p:nvPr/>
           </p:nvSpPr>
           <p:spPr>
             <a:xfrm>
               <a:off x="1305360" y="3200760"/>
-              <a:ext cx="492840" cy="516600"/>
+              <a:ext cx="492480" cy="516240"/>
             </a:xfrm>
             <a:prstGeom prst="rect">
               <a:avLst/>
@@ -2940,14 +3156,14 @@
         </p:sp>
         <p:sp>
           <p:nvSpPr>
-            <p:cNvPr id="59" name="CustomShape 18"/>
+            <p:cNvPr id="61" name="CustomShape 18"/>
             <p:cNvSpPr/>
             <p:nvPr/>
           </p:nvSpPr>
           <p:spPr>
             <a:xfrm>
               <a:off x="1267200" y="3259800"/>
-              <a:ext cx="458640" cy="420840"/>
+              <a:ext cx="458280" cy="420480"/>
             </a:xfrm>
             <a:prstGeom prst="ellipse">
               <a:avLst/>
@@ -2977,28 +3193,28 @@
       </p:grpSp>
       <p:grpSp>
         <p:nvGrpSpPr>
-          <p:cNvPr id="60" name="Group 19"/>
+          <p:cNvPr id="62" name="Group 19"/>
           <p:cNvGrpSpPr/>
           <p:nvPr/>
         </p:nvGrpSpPr>
         <p:grpSpPr>
           <a:xfrm>
             <a:off x="6706080" y="3200760"/>
-            <a:ext cx="578520" cy="516600"/>
+            <a:ext cx="578160" cy="516240"/>
             <a:chOff x="6706080" y="3200760"/>
-            <a:chExt cx="578520" cy="516600"/>
+            <a:chExt cx="578160" cy="516240"/>
           </a:xfrm>
         </p:grpSpPr>
         <p:sp>
           <p:nvSpPr>
-            <p:cNvPr id="61" name="CustomShape 20"/>
+            <p:cNvPr id="63" name="CustomShape 20"/>
             <p:cNvSpPr/>
             <p:nvPr/>
           </p:nvSpPr>
           <p:spPr>
             <a:xfrm>
               <a:off x="6791760" y="3200760"/>
-              <a:ext cx="492840" cy="516600"/>
+              <a:ext cx="492480" cy="516240"/>
             </a:xfrm>
             <a:prstGeom prst="rect">
               <a:avLst/>
@@ -3042,14 +3258,14 @@
         </p:sp>
         <p:sp>
           <p:nvSpPr>
-            <p:cNvPr id="62" name="CustomShape 21"/>
+            <p:cNvPr id="64" name="CustomShape 21"/>
             <p:cNvSpPr/>
             <p:nvPr/>
           </p:nvSpPr>
           <p:spPr>
             <a:xfrm>
               <a:off x="6706080" y="3286080"/>
-              <a:ext cx="458640" cy="420840"/>
+              <a:ext cx="458280" cy="420480"/>
             </a:xfrm>
             <a:prstGeom prst="ellipse">
               <a:avLst/>

</xml_diff>